<commit_message>
Avancées sur le fichier PP + PDF.
</commit_message>
<xml_diff>
--- a/Horn_Mickael_presentation_4_102022.pptx
+++ b/Horn_Mickael_presentation_4_102022.pptx
@@ -12,6 +12,8 @@
     <p:sldId id="260" r:id="rId6"/>
     <p:sldId id="262" r:id="rId7"/>
     <p:sldId id="263" r:id="rId8"/>
+    <p:sldId id="264" r:id="rId9"/>
+    <p:sldId id="265" r:id="rId10"/>
   </p:sldIdLst>
   <p:sldSz cx="12192000" cy="6858000"/>
   <p:notesSz cx="6858000" cy="9144000"/>
@@ -110,6 +112,11 @@
       </a:defRPr>
     </a:lvl9pPr>
   </p:defaultTextStyle>
+  <p:extLst>
+    <p:ext uri="{EFAFB233-063F-42B5-8137-9DF3F51BA10A}">
+      <p15:sldGuideLst xmlns:p15="http://schemas.microsoft.com/office/powerpoint/2012/main"/>
+    </p:ext>
+  </p:extLst>
 </p:presentation>
 </file>
 
@@ -351,7 +358,7 @@
           <a:p>
             <a:fld id="{ED291B17-9318-49DB-B28B-6E5994AE9581}" type="datetime1">
               <a:rPr lang="en-US" smtClean="0"/>
-              <a:t>1/6/23</a:t>
+              <a:t>1/8/23</a:t>
             </a:fld>
             <a:endParaRPr lang="en-US" dirty="0"/>
           </a:p>
@@ -554,7 +561,7 @@
           <a:p>
             <a:fld id="{2CED4963-E985-44C4-B8C4-FDD613B7C2F8}" type="datetime1">
               <a:rPr lang="en-US" smtClean="0"/>
-              <a:t>1/6/23</a:t>
+              <a:t>1/8/23</a:t>
             </a:fld>
             <a:endParaRPr lang="en-US" dirty="0"/>
           </a:p>
@@ -916,7 +923,7 @@
           <a:p>
             <a:fld id="{ED291B17-9318-49DB-B28B-6E5994AE9581}" type="datetime1">
               <a:rPr lang="en-US" smtClean="0"/>
-              <a:t>1/6/23</a:t>
+              <a:t>1/8/23</a:t>
             </a:fld>
             <a:endParaRPr lang="en-US" dirty="0"/>
           </a:p>
@@ -1114,7 +1121,7 @@
           <a:p>
             <a:fld id="{78DD82B9-B8EE-4375-B6FF-88FA6ABB15D9}" type="datetime1">
               <a:rPr lang="en-US" smtClean="0"/>
-              <a:t>1/6/23</a:t>
+              <a:t>1/8/23</a:t>
             </a:fld>
             <a:endParaRPr lang="en-US" dirty="0"/>
           </a:p>
@@ -1426,7 +1433,7 @@
           <a:p>
             <a:fld id="{B2497495-0637-405E-AE64-5CC7506D51F5}" type="datetime1">
               <a:rPr lang="en-US" smtClean="0"/>
-              <a:t>1/6/23</a:t>
+              <a:t>1/8/23</a:t>
             </a:fld>
             <a:endParaRPr lang="en-US" dirty="0"/>
           </a:p>
@@ -1679,7 +1686,7 @@
           <a:p>
             <a:fld id="{7BFFD690-9426-415D-8B65-26881E07B2D4}" type="datetime1">
               <a:rPr lang="en-US" smtClean="0"/>
-              <a:t>1/6/23</a:t>
+              <a:t>1/8/23</a:t>
             </a:fld>
             <a:endParaRPr lang="en-US" dirty="0"/>
           </a:p>
@@ -2101,7 +2108,7 @@
           <a:p>
             <a:fld id="{04C4989A-474C-40DE-95B9-011C28B71673}" type="datetime1">
               <a:rPr lang="en-US" smtClean="0"/>
-              <a:t>1/6/23</a:t>
+              <a:t>1/8/23</a:t>
             </a:fld>
             <a:endParaRPr lang="en-US" dirty="0"/>
           </a:p>
@@ -2224,7 +2231,7 @@
           <a:p>
             <a:fld id="{5DB4ED54-5B5E-4A04-93D3-5772E3CE3818}" type="datetime1">
               <a:rPr lang="en-US" smtClean="0"/>
-              <a:t>1/6/23</a:t>
+              <a:t>1/8/23</a:t>
             </a:fld>
             <a:endParaRPr lang="en-US" dirty="0"/>
           </a:p>
@@ -2319,7 +2326,7 @@
           <a:p>
             <a:fld id="{4EDE50D6-574B-40AF-946F-D52A04ADE379}" type="datetime1">
               <a:rPr lang="en-US" smtClean="0"/>
-              <a:t>1/6/23</a:t>
+              <a:t>1/8/23</a:t>
             </a:fld>
             <a:endParaRPr lang="en-US" dirty="0"/>
           </a:p>
@@ -2696,7 +2703,7 @@
           <a:p>
             <a:fld id="{D82884F1-FFEA-405F-9602-3DCA865EDA4E}" type="datetime1">
               <a:rPr lang="en-US" smtClean="0"/>
-              <a:t>1/6/23</a:t>
+              <a:t>1/8/23</a:t>
             </a:fld>
             <a:endParaRPr lang="en-US" dirty="0"/>
           </a:p>
@@ -2989,7 +2996,7 @@
           <a:p>
             <a:fld id="{7E18DB4A-8810-4A10-AD5C-D5E2C667F5B3}" type="datetime1">
               <a:rPr lang="en-US" smtClean="0"/>
-              <a:t>1/6/23</a:t>
+              <a:t>1/8/23</a:t>
             </a:fld>
             <a:endParaRPr lang="en-US" dirty="0"/>
           </a:p>
@@ -3204,7 +3211,7 @@
           <a:p>
             <a:fld id="{ED291B17-9318-49DB-B28B-6E5994AE9581}" type="datetime1">
               <a:rPr lang="en-US" smtClean="0"/>
-              <a:t>1/6/23</a:t>
+              <a:t>1/8/23</a:t>
             </a:fld>
             <a:endParaRPr lang="en-US" dirty="0"/>
           </a:p>
@@ -5471,7 +5478,7 @@
         </p:blipFill>
         <p:spPr>
           <a:xfrm>
-            <a:off x="1475705" y="737763"/>
+            <a:off x="9079348" y="737763"/>
             <a:ext cx="1636949" cy="3539352"/>
           </a:xfrm>
           <a:prstGeom prst="rect">
@@ -5543,7 +5550,7 @@
         </p:blipFill>
         <p:spPr>
           <a:xfrm>
-            <a:off x="9079346" y="737763"/>
+            <a:off x="1475703" y="737763"/>
             <a:ext cx="1636949" cy="3539352"/>
           </a:xfrm>
           <a:prstGeom prst="rect">
@@ -5926,7 +5933,7 @@
               <a:buChar char=""/>
             </a:pPr>
             <a:r>
-              <a:rPr lang="en-US">
+              <a:rPr lang="en-US" dirty="0" err="1">
                 <a:solidFill>
                   <a:schemeClr val="tx1">
                     <a:lumMod val="75000"/>
@@ -5934,7 +5941,18 @@
                   </a:schemeClr>
                 </a:solidFill>
               </a:rPr>
-              <a:t>Fichiers Service</a:t>
+              <a:t>Fichiers</a:t>
+            </a:r>
+            <a:r>
+              <a:rPr lang="en-US" dirty="0">
+                <a:solidFill>
+                  <a:schemeClr val="tx1">
+                    <a:lumMod val="75000"/>
+                    <a:lumOff val="25000"/>
+                  </a:schemeClr>
+                </a:solidFill>
+              </a:rPr>
+              <a:t> Service</a:t>
             </a:r>
           </a:p>
           <a:p>
@@ -5953,7 +5971,7 @@
               <a:buChar char=""/>
             </a:pPr>
             <a:r>
-              <a:rPr lang="en-US">
+              <a:rPr lang="en-US" dirty="0">
                 <a:solidFill>
                   <a:schemeClr val="tx1">
                     <a:lumMod val="75000"/>
@@ -5961,7 +5979,51 @@
                   </a:schemeClr>
                 </a:solidFill>
               </a:rPr>
-              <a:t>Appels API (URLSession, dataTask)</a:t>
+              <a:t>Appels API (</a:t>
+            </a:r>
+            <a:r>
+              <a:rPr lang="en-US" dirty="0" err="1">
+                <a:solidFill>
+                  <a:schemeClr val="tx1">
+                    <a:lumMod val="75000"/>
+                    <a:lumOff val="25000"/>
+                  </a:schemeClr>
+                </a:solidFill>
+              </a:rPr>
+              <a:t>URLSession</a:t>
+            </a:r>
+            <a:r>
+              <a:rPr lang="en-US" dirty="0">
+                <a:solidFill>
+                  <a:schemeClr val="tx1">
+                    <a:lumMod val="75000"/>
+                    <a:lumOff val="25000"/>
+                  </a:schemeClr>
+                </a:solidFill>
+              </a:rPr>
+              <a:t>, </a:t>
+            </a:r>
+            <a:r>
+              <a:rPr lang="en-US" dirty="0" err="1">
+                <a:solidFill>
+                  <a:schemeClr val="tx1">
+                    <a:lumMod val="75000"/>
+                    <a:lumOff val="25000"/>
+                  </a:schemeClr>
+                </a:solidFill>
+              </a:rPr>
+              <a:t>dataTask</a:t>
+            </a:r>
+            <a:r>
+              <a:rPr lang="en-US" dirty="0">
+                <a:solidFill>
+                  <a:schemeClr val="tx1">
+                    <a:lumMod val="75000"/>
+                    <a:lumOff val="25000"/>
+                  </a:schemeClr>
+                </a:solidFill>
+              </a:rPr>
+              <a:t>)</a:t>
             </a:r>
           </a:p>
           <a:p>
@@ -5980,7 +6042,7 @@
               <a:buChar char=""/>
             </a:pPr>
             <a:r>
-              <a:rPr lang="en-US">
+              <a:rPr lang="en-US" dirty="0">
                 <a:solidFill>
                   <a:schemeClr val="tx1">
                     <a:lumMod val="75000"/>
@@ -6007,7 +6069,7 @@
               <a:buChar char=""/>
             </a:pPr>
             <a:r>
-              <a:rPr lang="en-US">
+              <a:rPr lang="en-US" dirty="0">
                 <a:solidFill>
                   <a:schemeClr val="tx1">
                     <a:lumMod val="75000"/>
@@ -6015,8 +6077,27 @@
                   </a:schemeClr>
                 </a:solidFill>
               </a:rPr>
-              <a:t>Callback avec le résultat</a:t>
-            </a:r>
+              <a:t>Callback avec le </a:t>
+            </a:r>
+            <a:r>
+              <a:rPr lang="en-US" dirty="0" err="1">
+                <a:solidFill>
+                  <a:schemeClr val="tx1">
+                    <a:lumMod val="75000"/>
+                    <a:lumOff val="25000"/>
+                  </a:schemeClr>
+                </a:solidFill>
+              </a:rPr>
+              <a:t>résultat</a:t>
+            </a:r>
+            <a:endParaRPr lang="en-US" dirty="0">
+              <a:solidFill>
+                <a:schemeClr val="tx1">
+                  <a:lumMod val="75000"/>
+                  <a:lumOff val="25000"/>
+                </a:schemeClr>
+              </a:solidFill>
+            </a:endParaRPr>
           </a:p>
           <a:p>
             <a:pPr marL="285750" indent="-285750" defTabSz="457200">
@@ -6033,7 +6114,7 @@
               <a:buFont typeface="Wingdings 2" panose="05020102010507070707" pitchFamily="18" charset="2"/>
               <a:buChar char=""/>
             </a:pPr>
-            <a:endParaRPr lang="en-US">
+            <a:endParaRPr lang="en-US" dirty="0">
               <a:solidFill>
                 <a:schemeClr val="tx1">
                   <a:lumMod val="75000"/>
@@ -6058,7 +6139,7 @@
               <a:buChar char=""/>
             </a:pPr>
             <a:r>
-              <a:rPr lang="en-US">
+              <a:rPr lang="en-US" dirty="0" err="1">
                 <a:solidFill>
                   <a:schemeClr val="tx1">
                     <a:lumMod val="75000"/>
@@ -6066,7 +6147,18 @@
                   </a:schemeClr>
                 </a:solidFill>
               </a:rPr>
-              <a:t>Fichiers Response</a:t>
+              <a:t>Fichiers</a:t>
+            </a:r>
+            <a:r>
+              <a:rPr lang="en-US" dirty="0">
+                <a:solidFill>
+                  <a:schemeClr val="tx1">
+                    <a:lumMod val="75000"/>
+                    <a:lumOff val="25000"/>
+                  </a:schemeClr>
+                </a:solidFill>
+              </a:rPr>
+              <a:t> Response</a:t>
             </a:r>
           </a:p>
           <a:p>
@@ -6085,7 +6177,7 @@
               <a:buChar char=""/>
             </a:pPr>
             <a:r>
-              <a:rPr lang="en-US">
+              <a:rPr lang="en-US" dirty="0" err="1">
                 <a:solidFill>
                   <a:schemeClr val="tx1">
                     <a:lumMod val="75000"/>
@@ -6093,7 +6185,62 @@
                   </a:schemeClr>
                 </a:solidFill>
               </a:rPr>
-              <a:t>Squelette du fichier JSON de l’appel API</a:t>
+              <a:t>Squelette</a:t>
+            </a:r>
+            <a:r>
+              <a:rPr lang="en-US" dirty="0">
+                <a:solidFill>
+                  <a:schemeClr val="tx1">
+                    <a:lumMod val="75000"/>
+                    <a:lumOff val="25000"/>
+                  </a:schemeClr>
+                </a:solidFill>
+              </a:rPr>
+              <a:t> du </a:t>
+            </a:r>
+            <a:r>
+              <a:rPr lang="en-US" dirty="0" err="1">
+                <a:solidFill>
+                  <a:schemeClr val="tx1">
+                    <a:lumMod val="75000"/>
+                    <a:lumOff val="25000"/>
+                  </a:schemeClr>
+                </a:solidFill>
+              </a:rPr>
+              <a:t>fichier</a:t>
+            </a:r>
+            <a:r>
+              <a:rPr lang="en-US" dirty="0">
+                <a:solidFill>
+                  <a:schemeClr val="tx1">
+                    <a:lumMod val="75000"/>
+                    <a:lumOff val="25000"/>
+                  </a:schemeClr>
+                </a:solidFill>
+              </a:rPr>
+              <a:t> JSON de </a:t>
+            </a:r>
+            <a:r>
+              <a:rPr lang="en-US" dirty="0" err="1">
+                <a:solidFill>
+                  <a:schemeClr val="tx1">
+                    <a:lumMod val="75000"/>
+                    <a:lumOff val="25000"/>
+                  </a:schemeClr>
+                </a:solidFill>
+              </a:rPr>
+              <a:t>l’appel</a:t>
+            </a:r>
+            <a:r>
+              <a:rPr lang="en-US" dirty="0">
+                <a:solidFill>
+                  <a:schemeClr val="tx1">
+                    <a:lumMod val="75000"/>
+                    <a:lumOff val="25000"/>
+                  </a:schemeClr>
+                </a:solidFill>
+              </a:rPr>
+              <a:t> API</a:t>
             </a:r>
           </a:p>
           <a:p>
@@ -6111,7 +6258,7 @@
               <a:buFont typeface="Wingdings 2" panose="05020102010507070707" pitchFamily="18" charset="2"/>
               <a:buChar char=""/>
             </a:pPr>
-            <a:endParaRPr lang="en-US">
+            <a:endParaRPr lang="en-US" dirty="0">
               <a:solidFill>
                 <a:schemeClr val="tx1">
                   <a:lumMod val="75000"/>
@@ -6135,7 +6282,7 @@
               <a:buFont typeface="Wingdings 2" panose="05020102010507070707" pitchFamily="18" charset="2"/>
               <a:buChar char=""/>
             </a:pPr>
-            <a:endParaRPr lang="en-US">
+            <a:endParaRPr lang="en-US" dirty="0">
               <a:solidFill>
                 <a:schemeClr val="tx1">
                   <a:lumMod val="75000"/>
@@ -6311,7 +6458,7 @@
           <a:lstStyle/>
           <a:p>
             <a:r>
-              <a:rPr lang="en-US" sz="4000" b="0" kern="1200" cap="all">
+              <a:rPr lang="en-US" sz="4000" b="0" kern="1200" cap="all" dirty="0">
                 <a:solidFill>
                   <a:schemeClr val="tx1">
                     <a:lumMod val="85000"/>
@@ -6322,7 +6469,35 @@
                 <a:ea typeface="+mj-ea"/>
                 <a:cs typeface="+mj-cs"/>
               </a:rPr>
-              <a:t>Structure mvc - controller</a:t>
+              <a:t>Structure </a:t>
+            </a:r>
+            <a:r>
+              <a:rPr lang="en-US" sz="4000" b="0" kern="1200" cap="all" dirty="0" err="1">
+                <a:solidFill>
+                  <a:schemeClr val="tx1">
+                    <a:lumMod val="85000"/>
+                    <a:lumOff val="15000"/>
+                  </a:schemeClr>
+                </a:solidFill>
+                <a:latin typeface="+mj-lt"/>
+                <a:ea typeface="+mj-ea"/>
+                <a:cs typeface="+mj-cs"/>
+              </a:rPr>
+              <a:t>mvc</a:t>
+            </a:r>
+            <a:r>
+              <a:rPr lang="en-US" sz="4000" b="0" kern="1200" cap="all" dirty="0">
+                <a:solidFill>
+                  <a:schemeClr val="tx1">
+                    <a:lumMod val="85000"/>
+                    <a:lumOff val="15000"/>
+                  </a:schemeClr>
+                </a:solidFill>
+                <a:latin typeface="+mj-lt"/>
+                <a:ea typeface="+mj-ea"/>
+                <a:cs typeface="+mj-cs"/>
+              </a:rPr>
+              <a:t> - controller</a:t>
             </a:r>
           </a:p>
         </p:txBody>
@@ -6485,7 +6660,7 @@
               <a:buChar char=""/>
             </a:pPr>
             <a:r>
-              <a:rPr lang="en-US" sz="1400">
+              <a:rPr lang="en-US" sz="1400" dirty="0" err="1">
                 <a:solidFill>
                   <a:schemeClr val="tx1">
                     <a:lumMod val="75000"/>
@@ -6495,6 +6670,14 @@
               </a:rPr>
               <a:t>ExchangeVC</a:t>
             </a:r>
+            <a:endParaRPr lang="en-US" sz="1400" dirty="0">
+              <a:solidFill>
+                <a:schemeClr val="tx1">
+                  <a:lumMod val="75000"/>
+                  <a:lumOff val="25000"/>
+                </a:schemeClr>
+              </a:solidFill>
+            </a:endParaRPr>
           </a:p>
           <a:p>
             <a:pPr marL="742950" lvl="1" indent="-285750" defTabSz="457200">
@@ -6515,7 +6698,7 @@
               <a:buChar char=""/>
             </a:pPr>
             <a:r>
-              <a:rPr lang="en-US" sz="1400">
+              <a:rPr lang="en-US" sz="1400" dirty="0" err="1">
                 <a:solidFill>
                   <a:schemeClr val="tx1">
                     <a:lumMod val="75000"/>
@@ -6523,8 +6706,60 @@
                   </a:schemeClr>
                 </a:solidFill>
               </a:rPr>
-              <a:t>Demande le taux de change au modèle</a:t>
-            </a:r>
+              <a:t>Demande</a:t>
+            </a:r>
+            <a:r>
+              <a:rPr lang="en-US" sz="1400" dirty="0">
+                <a:solidFill>
+                  <a:schemeClr val="tx1">
+                    <a:lumMod val="75000"/>
+                    <a:lumOff val="25000"/>
+                  </a:schemeClr>
+                </a:solidFill>
+              </a:rPr>
+              <a:t> le </a:t>
+            </a:r>
+            <a:r>
+              <a:rPr lang="en-US" sz="1400" dirty="0" err="1">
+                <a:solidFill>
+                  <a:schemeClr val="tx1">
+                    <a:lumMod val="75000"/>
+                    <a:lumOff val="25000"/>
+                  </a:schemeClr>
+                </a:solidFill>
+              </a:rPr>
+              <a:t>taux</a:t>
+            </a:r>
+            <a:r>
+              <a:rPr lang="en-US" sz="1400" dirty="0">
+                <a:solidFill>
+                  <a:schemeClr val="tx1">
+                    <a:lumMod val="75000"/>
+                    <a:lumOff val="25000"/>
+                  </a:schemeClr>
+                </a:solidFill>
+              </a:rPr>
+              <a:t> de change au </a:t>
+            </a:r>
+            <a:r>
+              <a:rPr lang="en-US" sz="1400" dirty="0" err="1">
+                <a:solidFill>
+                  <a:schemeClr val="tx1">
+                    <a:lumMod val="75000"/>
+                    <a:lumOff val="25000"/>
+                  </a:schemeClr>
+                </a:solidFill>
+              </a:rPr>
+              <a:t>modèle</a:t>
+            </a:r>
+            <a:endParaRPr lang="en-US" sz="1400" dirty="0">
+              <a:solidFill>
+                <a:schemeClr val="tx1">
+                  <a:lumMod val="75000"/>
+                  <a:lumOff val="25000"/>
+                </a:schemeClr>
+              </a:solidFill>
+            </a:endParaRPr>
           </a:p>
           <a:p>
             <a:pPr marL="742950" lvl="1" indent="-285750" defTabSz="457200">
@@ -6545,7 +6780,7 @@
               <a:buChar char=""/>
             </a:pPr>
             <a:r>
-              <a:rPr lang="en-US" sz="1400">
+              <a:rPr lang="en-US" sz="1400" dirty="0">
                 <a:solidFill>
                   <a:schemeClr val="tx1">
                     <a:lumMod val="75000"/>
@@ -6553,8 +6788,49 @@
                   </a:schemeClr>
                 </a:solidFill>
               </a:rPr>
-              <a:t>Affiche celui-ci dans la vue</a:t>
-            </a:r>
+              <a:t>Affiche </a:t>
+            </a:r>
+            <a:r>
+              <a:rPr lang="en-US" sz="1400" dirty="0" err="1">
+                <a:solidFill>
+                  <a:schemeClr val="tx1">
+                    <a:lumMod val="75000"/>
+                    <a:lumOff val="25000"/>
+                  </a:schemeClr>
+                </a:solidFill>
+              </a:rPr>
+              <a:t>celui</a:t>
+            </a:r>
+            <a:r>
+              <a:rPr lang="en-US" sz="1400" dirty="0">
+                <a:solidFill>
+                  <a:schemeClr val="tx1">
+                    <a:lumMod val="75000"/>
+                    <a:lumOff val="25000"/>
+                  </a:schemeClr>
+                </a:solidFill>
+              </a:rPr>
+              <a:t>-ci dans la </a:t>
+            </a:r>
+            <a:r>
+              <a:rPr lang="en-US" sz="1400" dirty="0" err="1">
+                <a:solidFill>
+                  <a:schemeClr val="tx1">
+                    <a:lumMod val="75000"/>
+                    <a:lumOff val="25000"/>
+                  </a:schemeClr>
+                </a:solidFill>
+              </a:rPr>
+              <a:t>vue</a:t>
+            </a:r>
+            <a:endParaRPr lang="en-US" sz="1400" dirty="0">
+              <a:solidFill>
+                <a:schemeClr val="tx1">
+                  <a:lumMod val="75000"/>
+                  <a:lumOff val="25000"/>
+                </a:schemeClr>
+              </a:solidFill>
+            </a:endParaRPr>
           </a:p>
           <a:p>
             <a:pPr marL="742950" lvl="1" indent="-285750" defTabSz="457200">
@@ -6575,7 +6851,7 @@
               <a:buChar char=""/>
             </a:pPr>
             <a:r>
-              <a:rPr lang="en-US" sz="1400">
+              <a:rPr lang="en-US" sz="1400" dirty="0" err="1">
                 <a:solidFill>
                   <a:schemeClr val="tx1">
                     <a:lumMod val="75000"/>
@@ -6583,7 +6859,40 @@
                   </a:schemeClr>
                 </a:solidFill>
               </a:rPr>
-              <a:t>Calcule le taux de change</a:t>
+              <a:t>Calcule</a:t>
+            </a:r>
+            <a:r>
+              <a:rPr lang="en-US" sz="1400" dirty="0">
+                <a:solidFill>
+                  <a:schemeClr val="tx1">
+                    <a:lumMod val="75000"/>
+                    <a:lumOff val="25000"/>
+                  </a:schemeClr>
+                </a:solidFill>
+              </a:rPr>
+              <a:t> le </a:t>
+            </a:r>
+            <a:r>
+              <a:rPr lang="en-US" sz="1400" dirty="0" err="1">
+                <a:solidFill>
+                  <a:schemeClr val="tx1">
+                    <a:lumMod val="75000"/>
+                    <a:lumOff val="25000"/>
+                  </a:schemeClr>
+                </a:solidFill>
+              </a:rPr>
+              <a:t>taux</a:t>
+            </a:r>
+            <a:r>
+              <a:rPr lang="en-US" sz="1400" dirty="0">
+                <a:solidFill>
+                  <a:schemeClr val="tx1">
+                    <a:lumMod val="75000"/>
+                    <a:lumOff val="25000"/>
+                  </a:schemeClr>
+                </a:solidFill>
+              </a:rPr>
+              <a:t> de change</a:t>
             </a:r>
           </a:p>
           <a:p>
@@ -6605,7 +6914,7 @@
               <a:buChar char=""/>
             </a:pPr>
             <a:r>
-              <a:rPr lang="en-US" sz="1400">
+              <a:rPr lang="en-US" sz="1400" dirty="0" err="1">
                 <a:solidFill>
                   <a:schemeClr val="tx1">
                     <a:lumMod val="75000"/>
@@ -6615,6 +6924,14 @@
               </a:rPr>
               <a:t>TraductionVC</a:t>
             </a:r>
+            <a:endParaRPr lang="en-US" sz="1400" dirty="0">
+              <a:solidFill>
+                <a:schemeClr val="tx1">
+                  <a:lumMod val="75000"/>
+                  <a:lumOff val="25000"/>
+                </a:schemeClr>
+              </a:solidFill>
+            </a:endParaRPr>
           </a:p>
           <a:p>
             <a:pPr marL="742950" lvl="1" indent="-285750" defTabSz="457200">
@@ -6635,7 +6952,7 @@
               <a:buChar char=""/>
             </a:pPr>
             <a:r>
-              <a:rPr lang="en-US" sz="1400">
+              <a:rPr lang="en-US" sz="1400" dirty="0" err="1">
                 <a:solidFill>
                   <a:schemeClr val="tx1">
                     <a:lumMod val="75000"/>
@@ -6643,8 +6960,60 @@
                   </a:schemeClr>
                 </a:solidFill>
               </a:rPr>
-              <a:t>Demande la traduction au modèle</a:t>
-            </a:r>
+              <a:t>Demande</a:t>
+            </a:r>
+            <a:r>
+              <a:rPr lang="en-US" sz="1400" dirty="0">
+                <a:solidFill>
+                  <a:schemeClr val="tx1">
+                    <a:lumMod val="75000"/>
+                    <a:lumOff val="25000"/>
+                  </a:schemeClr>
+                </a:solidFill>
+              </a:rPr>
+              <a:t> la </a:t>
+            </a:r>
+            <a:r>
+              <a:rPr lang="en-US" sz="1400" dirty="0" err="1">
+                <a:solidFill>
+                  <a:schemeClr val="tx1">
+                    <a:lumMod val="75000"/>
+                    <a:lumOff val="25000"/>
+                  </a:schemeClr>
+                </a:solidFill>
+              </a:rPr>
+              <a:t>traduction</a:t>
+            </a:r>
+            <a:r>
+              <a:rPr lang="en-US" sz="1400" dirty="0">
+                <a:solidFill>
+                  <a:schemeClr val="tx1">
+                    <a:lumMod val="75000"/>
+                    <a:lumOff val="25000"/>
+                  </a:schemeClr>
+                </a:solidFill>
+              </a:rPr>
+              <a:t> au </a:t>
+            </a:r>
+            <a:r>
+              <a:rPr lang="en-US" sz="1400" dirty="0" err="1">
+                <a:solidFill>
+                  <a:schemeClr val="tx1">
+                    <a:lumMod val="75000"/>
+                    <a:lumOff val="25000"/>
+                  </a:schemeClr>
+                </a:solidFill>
+              </a:rPr>
+              <a:t>modèle</a:t>
+            </a:r>
+            <a:endParaRPr lang="en-US" sz="1400" dirty="0">
+              <a:solidFill>
+                <a:schemeClr val="tx1">
+                  <a:lumMod val="75000"/>
+                  <a:lumOff val="25000"/>
+                </a:schemeClr>
+              </a:solidFill>
+            </a:endParaRPr>
           </a:p>
           <a:p>
             <a:pPr marL="742950" lvl="1" indent="-285750" defTabSz="457200">
@@ -6665,7 +7034,7 @@
               <a:buChar char=""/>
             </a:pPr>
             <a:r>
-              <a:rPr lang="en-US" sz="1400">
+              <a:rPr lang="en-US" sz="1400" dirty="0">
                 <a:solidFill>
                   <a:schemeClr val="tx1">
                     <a:lumMod val="75000"/>
@@ -6673,8 +7042,49 @@
                   </a:schemeClr>
                 </a:solidFill>
               </a:rPr>
-              <a:t>Affiche le résultat dans la vue</a:t>
-            </a:r>
+              <a:t>Affiche le </a:t>
+            </a:r>
+            <a:r>
+              <a:rPr lang="en-US" sz="1400" dirty="0" err="1">
+                <a:solidFill>
+                  <a:schemeClr val="tx1">
+                    <a:lumMod val="75000"/>
+                    <a:lumOff val="25000"/>
+                  </a:schemeClr>
+                </a:solidFill>
+              </a:rPr>
+              <a:t>résultat</a:t>
+            </a:r>
+            <a:r>
+              <a:rPr lang="en-US" sz="1400" dirty="0">
+                <a:solidFill>
+                  <a:schemeClr val="tx1">
+                    <a:lumMod val="75000"/>
+                    <a:lumOff val="25000"/>
+                  </a:schemeClr>
+                </a:solidFill>
+              </a:rPr>
+              <a:t> dans la </a:t>
+            </a:r>
+            <a:r>
+              <a:rPr lang="en-US" sz="1400" dirty="0" err="1">
+                <a:solidFill>
+                  <a:schemeClr val="tx1">
+                    <a:lumMod val="75000"/>
+                    <a:lumOff val="25000"/>
+                  </a:schemeClr>
+                </a:solidFill>
+              </a:rPr>
+              <a:t>vue</a:t>
+            </a:r>
+            <a:endParaRPr lang="en-US" sz="1400" dirty="0">
+              <a:solidFill>
+                <a:schemeClr val="tx1">
+                  <a:lumMod val="75000"/>
+                  <a:lumOff val="25000"/>
+                </a:schemeClr>
+              </a:solidFill>
+            </a:endParaRPr>
           </a:p>
           <a:p>
             <a:pPr marL="285750" indent="-285750" defTabSz="457200">
@@ -6695,7 +7105,7 @@
               <a:buChar char=""/>
             </a:pPr>
             <a:r>
-              <a:rPr lang="en-US" sz="1400">
+              <a:rPr lang="en-US" sz="1400" dirty="0" err="1">
                 <a:solidFill>
                   <a:schemeClr val="tx1">
                     <a:lumMod val="75000"/>
@@ -6705,6 +7115,14 @@
               </a:rPr>
               <a:t>WeatherVC</a:t>
             </a:r>
+            <a:endParaRPr lang="en-US" sz="1400" dirty="0">
+              <a:solidFill>
+                <a:schemeClr val="tx1">
+                  <a:lumMod val="75000"/>
+                  <a:lumOff val="25000"/>
+                </a:schemeClr>
+              </a:solidFill>
+            </a:endParaRPr>
           </a:p>
           <a:p>
             <a:pPr marL="742950" lvl="1" indent="-285750" defTabSz="457200">
@@ -6725,7 +7143,7 @@
               <a:buChar char=""/>
             </a:pPr>
             <a:r>
-              <a:rPr lang="en-US" sz="1400">
+              <a:rPr lang="en-US" sz="1400" dirty="0" err="1">
                 <a:solidFill>
                   <a:schemeClr val="tx1">
                     <a:lumMod val="75000"/>
@@ -6733,8 +7151,60 @@
                   </a:schemeClr>
                 </a:solidFill>
               </a:rPr>
-              <a:t>Demande la météo au modèle</a:t>
-            </a:r>
+              <a:t>Demande</a:t>
+            </a:r>
+            <a:r>
+              <a:rPr lang="en-US" sz="1400" dirty="0">
+                <a:solidFill>
+                  <a:schemeClr val="tx1">
+                    <a:lumMod val="75000"/>
+                    <a:lumOff val="25000"/>
+                  </a:schemeClr>
+                </a:solidFill>
+              </a:rPr>
+              <a:t> la </a:t>
+            </a:r>
+            <a:r>
+              <a:rPr lang="en-US" sz="1400" dirty="0" err="1">
+                <a:solidFill>
+                  <a:schemeClr val="tx1">
+                    <a:lumMod val="75000"/>
+                    <a:lumOff val="25000"/>
+                  </a:schemeClr>
+                </a:solidFill>
+              </a:rPr>
+              <a:t>météo</a:t>
+            </a:r>
+            <a:r>
+              <a:rPr lang="en-US" sz="1400" dirty="0">
+                <a:solidFill>
+                  <a:schemeClr val="tx1">
+                    <a:lumMod val="75000"/>
+                    <a:lumOff val="25000"/>
+                  </a:schemeClr>
+                </a:solidFill>
+              </a:rPr>
+              <a:t> au </a:t>
+            </a:r>
+            <a:r>
+              <a:rPr lang="en-US" sz="1400" dirty="0" err="1">
+                <a:solidFill>
+                  <a:schemeClr val="tx1">
+                    <a:lumMod val="75000"/>
+                    <a:lumOff val="25000"/>
+                  </a:schemeClr>
+                </a:solidFill>
+              </a:rPr>
+              <a:t>modèle</a:t>
+            </a:r>
+            <a:endParaRPr lang="en-US" sz="1400" dirty="0">
+              <a:solidFill>
+                <a:schemeClr val="tx1">
+                  <a:lumMod val="75000"/>
+                  <a:lumOff val="25000"/>
+                </a:schemeClr>
+              </a:solidFill>
+            </a:endParaRPr>
           </a:p>
           <a:p>
             <a:pPr marL="742950" lvl="1" indent="-285750" defTabSz="457200">
@@ -6755,7 +7225,7 @@
               <a:buChar char=""/>
             </a:pPr>
             <a:r>
-              <a:rPr lang="en-US" sz="1400">
+              <a:rPr lang="en-US" sz="1400" dirty="0">
                 <a:solidFill>
                   <a:schemeClr val="tx1">
                     <a:lumMod val="75000"/>
@@ -6763,8 +7233,49 @@
                   </a:schemeClr>
                 </a:solidFill>
               </a:rPr>
-              <a:t>Affiche la résultat dans la vue</a:t>
-            </a:r>
+              <a:t>Affiche la </a:t>
+            </a:r>
+            <a:r>
+              <a:rPr lang="en-US" sz="1400" dirty="0" err="1">
+                <a:solidFill>
+                  <a:schemeClr val="tx1">
+                    <a:lumMod val="75000"/>
+                    <a:lumOff val="25000"/>
+                  </a:schemeClr>
+                </a:solidFill>
+              </a:rPr>
+              <a:t>résultat</a:t>
+            </a:r>
+            <a:r>
+              <a:rPr lang="en-US" sz="1400" dirty="0">
+                <a:solidFill>
+                  <a:schemeClr val="tx1">
+                    <a:lumMod val="75000"/>
+                    <a:lumOff val="25000"/>
+                  </a:schemeClr>
+                </a:solidFill>
+              </a:rPr>
+              <a:t> dans la </a:t>
+            </a:r>
+            <a:r>
+              <a:rPr lang="en-US" sz="1400" dirty="0" err="1">
+                <a:solidFill>
+                  <a:schemeClr val="tx1">
+                    <a:lumMod val="75000"/>
+                    <a:lumOff val="25000"/>
+                  </a:schemeClr>
+                </a:solidFill>
+              </a:rPr>
+              <a:t>vue</a:t>
+            </a:r>
+            <a:endParaRPr lang="en-US" sz="1400" dirty="0">
+              <a:solidFill>
+                <a:schemeClr val="tx1">
+                  <a:lumMod val="75000"/>
+                  <a:lumOff val="25000"/>
+                </a:schemeClr>
+              </a:solidFill>
+            </a:endParaRPr>
           </a:p>
           <a:p>
             <a:pPr marL="285750" indent="-285750" defTabSz="457200">
@@ -6785,7 +7296,7 @@
               <a:buChar char=""/>
             </a:pPr>
             <a:r>
-              <a:rPr lang="en-US" sz="1400">
+              <a:rPr lang="en-US" sz="1400" dirty="0">
                 <a:solidFill>
                   <a:schemeClr val="tx1">
                     <a:lumMod val="75000"/>
@@ -6815,7 +7326,7 @@
               <a:buChar char=""/>
             </a:pPr>
             <a:r>
-              <a:rPr lang="en-US" sz="1400">
+              <a:rPr lang="en-US" sz="1400" dirty="0">
                 <a:solidFill>
                   <a:schemeClr val="tx1">
                     <a:lumMod val="75000"/>
@@ -6823,7 +7334,51 @@
                   </a:schemeClr>
                 </a:solidFill>
               </a:rPr>
-              <a:t>Gestion d’erreurs (presentAlert())</a:t>
+              <a:t>Gestion </a:t>
+            </a:r>
+            <a:r>
+              <a:rPr lang="en-US" sz="1400" dirty="0" err="1">
+                <a:solidFill>
+                  <a:schemeClr val="tx1">
+                    <a:lumMod val="75000"/>
+                    <a:lumOff val="25000"/>
+                  </a:schemeClr>
+                </a:solidFill>
+              </a:rPr>
+              <a:t>d’erreurs</a:t>
+            </a:r>
+            <a:r>
+              <a:rPr lang="en-US" sz="1400" dirty="0">
+                <a:solidFill>
+                  <a:schemeClr val="tx1">
+                    <a:lumMod val="75000"/>
+                    <a:lumOff val="25000"/>
+                  </a:schemeClr>
+                </a:solidFill>
+              </a:rPr>
+              <a:t> (</a:t>
+            </a:r>
+            <a:r>
+              <a:rPr lang="en-US" sz="1400" dirty="0" err="1">
+                <a:solidFill>
+                  <a:schemeClr val="tx1">
+                    <a:lumMod val="75000"/>
+                    <a:lumOff val="25000"/>
+                  </a:schemeClr>
+                </a:solidFill>
+              </a:rPr>
+              <a:t>presentAlert</a:t>
+            </a:r>
+            <a:r>
+              <a:rPr lang="en-US" sz="1400" dirty="0">
+                <a:solidFill>
+                  <a:schemeClr val="tx1">
+                    <a:lumMod val="75000"/>
+                    <a:lumOff val="25000"/>
+                  </a:schemeClr>
+                </a:solidFill>
+              </a:rPr>
+              <a:t>())</a:t>
             </a:r>
           </a:p>
         </p:txBody>
@@ -6938,6 +7493,14 @@
 <file path=ppt/slides/slide7.xml><?xml version="1.0" encoding="utf-8"?>
 <p:sld xmlns:a="http://schemas.openxmlformats.org/drawingml/2006/main" xmlns:r="http://schemas.openxmlformats.org/officeDocument/2006/relationships" xmlns:p="http://schemas.openxmlformats.org/presentationml/2006/main">
   <p:cSld>
+    <p:bg>
+      <p:bgPr>
+        <a:solidFill>
+          <a:schemeClr val="bg1"/>
+        </a:solidFill>
+        <a:effectLst/>
+      </p:bgPr>
+    </p:bg>
     <p:spTree>
       <p:nvGrpSpPr>
         <p:cNvPr id="1" name=""/>
@@ -6954,6 +7517,420 @@
       </p:grpSpPr>
       <p:sp>
         <p:nvSpPr>
+          <p:cNvPr id="9" name="Rectangle 8">
+            <a:extLst>
+              <a:ext uri="{FF2B5EF4-FFF2-40B4-BE49-F238E27FC236}">
+                <a16:creationId xmlns:a16="http://schemas.microsoft.com/office/drawing/2014/main" id="{DD651B61-325E-4E73-8445-38B0DE8AAAB6}"/>
+              </a:ext>
+              <a:ext uri="{C183D7F6-B498-43B3-948B-1728B52AA6E4}">
+                <adec:decorative xmlns:adec="http://schemas.microsoft.com/office/drawing/2017/decorative" val="1"/>
+              </a:ext>
+            </a:extLst>
+          </p:cNvPr>
+          <p:cNvSpPr>
+            <a:spLocks noGrp="1" noRot="1" noChangeAspect="1" noMove="1" noResize="1" noEditPoints="1" noAdjustHandles="1" noChangeArrowheads="1" noChangeShapeType="1" noTextEdit="1"/>
+          </p:cNvSpPr>
+          <p:nvPr>
+            <p:extLst>
+              <p:ext uri="{386F3935-93C4-4BCD-93E2-E3B085C9AB24}">
+                <p16:designElem xmlns:p16="http://schemas.microsoft.com/office/powerpoint/2015/main" val="1"/>
+              </p:ext>
+            </p:extLst>
+          </p:nvPr>
+        </p:nvSpPr>
+        <p:spPr>
+          <a:xfrm>
+            <a:off x="446534" y="457200"/>
+            <a:ext cx="3703320" cy="94997"/>
+          </a:xfrm>
+          <a:prstGeom prst="rect">
+            <a:avLst/>
+          </a:prstGeom>
+          <a:solidFill>
+            <a:srgbClr val="465359"/>
+          </a:solidFill>
+          <a:ln>
+            <a:noFill/>
+          </a:ln>
+          <a:effectLst/>
+        </p:spPr>
+        <p:style>
+          <a:lnRef idx="1">
+            <a:schemeClr val="accent1"/>
+          </a:lnRef>
+          <a:fillRef idx="3">
+            <a:schemeClr val="accent1"/>
+          </a:fillRef>
+          <a:effectRef idx="2">
+            <a:schemeClr val="accent1"/>
+          </a:effectRef>
+          <a:fontRef idx="minor">
+            <a:schemeClr val="lt1"/>
+          </a:fontRef>
+        </p:style>
+      </p:sp>
+      <p:sp>
+        <p:nvSpPr>
+          <p:cNvPr id="11" name="Rectangle 10">
+            <a:extLst>
+              <a:ext uri="{FF2B5EF4-FFF2-40B4-BE49-F238E27FC236}">
+                <a16:creationId xmlns:a16="http://schemas.microsoft.com/office/drawing/2014/main" id="{B42E5253-D3AC-4AC2-B766-8B34F13C2F5E}"/>
+              </a:ext>
+              <a:ext uri="{C183D7F6-B498-43B3-948B-1728B52AA6E4}">
+                <adec:decorative xmlns:adec="http://schemas.microsoft.com/office/drawing/2017/decorative" val="1"/>
+              </a:ext>
+            </a:extLst>
+          </p:cNvPr>
+          <p:cNvSpPr>
+            <a:spLocks noGrp="1" noRot="1" noChangeAspect="1" noMove="1" noResize="1" noEditPoints="1" noAdjustHandles="1" noChangeArrowheads="1" noChangeShapeType="1" noTextEdit="1"/>
+          </p:cNvSpPr>
+          <p:nvPr>
+            <p:extLst>
+              <p:ext uri="{386F3935-93C4-4BCD-93E2-E3B085C9AB24}">
+                <p16:designElem xmlns:p16="http://schemas.microsoft.com/office/powerpoint/2015/main" val="1"/>
+              </p:ext>
+            </p:extLst>
+          </p:nvPr>
+        </p:nvSpPr>
+        <p:spPr>
+          <a:xfrm>
+            <a:off x="8042147" y="453643"/>
+            <a:ext cx="3703320" cy="98554"/>
+          </a:xfrm>
+          <a:prstGeom prst="rect">
+            <a:avLst/>
+          </a:prstGeom>
+          <a:solidFill>
+            <a:srgbClr val="969FA7"/>
+          </a:solidFill>
+          <a:ln>
+            <a:noFill/>
+          </a:ln>
+          <a:effectLst/>
+        </p:spPr>
+        <p:style>
+          <a:lnRef idx="1">
+            <a:schemeClr val="accent1"/>
+          </a:lnRef>
+          <a:fillRef idx="3">
+            <a:schemeClr val="accent1"/>
+          </a:fillRef>
+          <a:effectRef idx="2">
+            <a:schemeClr val="accent1"/>
+          </a:effectRef>
+          <a:fontRef idx="minor">
+            <a:schemeClr val="lt1"/>
+          </a:fontRef>
+        </p:style>
+      </p:sp>
+      <p:sp>
+        <p:nvSpPr>
+          <p:cNvPr id="13" name="Rectangle 12">
+            <a:extLst>
+              <a:ext uri="{FF2B5EF4-FFF2-40B4-BE49-F238E27FC236}">
+                <a16:creationId xmlns:a16="http://schemas.microsoft.com/office/drawing/2014/main" id="{10AE8D57-436A-4073-9A75-15BB5949F8B4}"/>
+              </a:ext>
+              <a:ext uri="{C183D7F6-B498-43B3-948B-1728B52AA6E4}">
+                <adec:decorative xmlns:adec="http://schemas.microsoft.com/office/drawing/2017/decorative" val="1"/>
+              </a:ext>
+            </a:extLst>
+          </p:cNvPr>
+          <p:cNvSpPr>
+            <a:spLocks noGrp="1" noRot="1" noChangeAspect="1" noMove="1" noResize="1" noEditPoints="1" noAdjustHandles="1" noChangeArrowheads="1" noChangeShapeType="1" noTextEdit="1"/>
+          </p:cNvSpPr>
+          <p:nvPr>
+            <p:extLst>
+              <p:ext uri="{386F3935-93C4-4BCD-93E2-E3B085C9AB24}">
+                <p16:designElem xmlns:p16="http://schemas.microsoft.com/office/powerpoint/2015/main" val="1"/>
+              </p:ext>
+            </p:extLst>
+          </p:nvPr>
+        </p:nvSpPr>
+        <p:spPr>
+          <a:xfrm>
+            <a:off x="4241830" y="457200"/>
+            <a:ext cx="3703320" cy="91440"/>
+          </a:xfrm>
+          <a:prstGeom prst="rect">
+            <a:avLst/>
+          </a:prstGeom>
+          <a:solidFill>
+            <a:schemeClr val="accent1"/>
+          </a:solidFill>
+          <a:ln>
+            <a:noFill/>
+          </a:ln>
+          <a:effectLst/>
+        </p:spPr>
+        <p:style>
+          <a:lnRef idx="1">
+            <a:schemeClr val="accent1"/>
+          </a:lnRef>
+          <a:fillRef idx="3">
+            <a:schemeClr val="accent1"/>
+          </a:fillRef>
+          <a:effectRef idx="2">
+            <a:schemeClr val="accent1"/>
+          </a:effectRef>
+          <a:fontRef idx="minor">
+            <a:schemeClr val="lt1"/>
+          </a:fontRef>
+        </p:style>
+      </p:sp>
+      <p:sp>
+        <p:nvSpPr>
+          <p:cNvPr id="15" name="Rectangle 14">
+            <a:extLst>
+              <a:ext uri="{FF2B5EF4-FFF2-40B4-BE49-F238E27FC236}">
+                <a16:creationId xmlns:a16="http://schemas.microsoft.com/office/drawing/2014/main" id="{E2852671-8EB6-4EAF-8AF8-65CF3FD66456}"/>
+              </a:ext>
+              <a:ext uri="{C183D7F6-B498-43B3-948B-1728B52AA6E4}">
+                <adec:decorative xmlns:adec="http://schemas.microsoft.com/office/drawing/2017/decorative" val="1"/>
+              </a:ext>
+            </a:extLst>
+          </p:cNvPr>
+          <p:cNvSpPr>
+            <a:spLocks noGrp="1" noRot="1" noChangeAspect="1" noMove="1" noResize="1" noEditPoints="1" noAdjustHandles="1" noChangeArrowheads="1" noChangeShapeType="1" noTextEdit="1"/>
+          </p:cNvSpPr>
+          <p:nvPr>
+            <p:extLst>
+              <p:ext uri="{386F3935-93C4-4BCD-93E2-E3B085C9AB24}">
+                <p16:designElem xmlns:p16="http://schemas.microsoft.com/office/powerpoint/2015/main" val="1"/>
+              </p:ext>
+            </p:extLst>
+          </p:nvPr>
+        </p:nvSpPr>
+        <p:spPr>
+          <a:xfrm>
+            <a:off x="446534" y="3085764"/>
+            <a:ext cx="11298932" cy="3338149"/>
+          </a:xfrm>
+          <a:prstGeom prst="rect">
+            <a:avLst/>
+          </a:prstGeom>
+          <a:solidFill>
+            <a:srgbClr val="465359"/>
+          </a:solidFill>
+          <a:ln>
+            <a:noFill/>
+          </a:ln>
+          <a:effectLst/>
+        </p:spPr>
+        <p:style>
+          <a:lnRef idx="1">
+            <a:schemeClr val="accent1"/>
+          </a:lnRef>
+          <a:fillRef idx="3">
+            <a:schemeClr val="accent1"/>
+          </a:fillRef>
+          <a:effectRef idx="2">
+            <a:schemeClr val="accent1"/>
+          </a:effectRef>
+          <a:fontRef idx="minor">
+            <a:schemeClr val="lt1"/>
+          </a:fontRef>
+        </p:style>
+      </p:sp>
+      <p:sp useBgFill="1">
+        <p:nvSpPr>
+          <p:cNvPr id="17" name="Rectangle 16">
+            <a:extLst>
+              <a:ext uri="{FF2B5EF4-FFF2-40B4-BE49-F238E27FC236}">
+                <a16:creationId xmlns:a16="http://schemas.microsoft.com/office/drawing/2014/main" id="{26B4480E-B7FF-4481-890E-043A69AE6FE2}"/>
+              </a:ext>
+              <a:ext uri="{C183D7F6-B498-43B3-948B-1728B52AA6E4}">
+                <adec:decorative xmlns:adec="http://schemas.microsoft.com/office/drawing/2017/decorative" val="1"/>
+              </a:ext>
+            </a:extLst>
+          </p:cNvPr>
+          <p:cNvSpPr>
+            <a:spLocks noGrp="1" noRot="1" noChangeAspect="1" noMove="1" noResize="1" noEditPoints="1" noAdjustHandles="1" noChangeArrowheads="1" noChangeShapeType="1" noTextEdit="1"/>
+          </p:cNvSpPr>
+          <p:nvPr>
+            <p:extLst>
+              <p:ext uri="{386F3935-93C4-4BCD-93E2-E3B085C9AB24}">
+                <p16:designElem xmlns:p16="http://schemas.microsoft.com/office/powerpoint/2015/main" val="1"/>
+              </p:ext>
+            </p:extLst>
+          </p:nvPr>
+        </p:nvSpPr>
+        <p:spPr>
+          <a:xfrm>
+            <a:off x="0" y="0"/>
+            <a:ext cx="12192000" cy="6858000"/>
+          </a:xfrm>
+          <a:prstGeom prst="rect">
+            <a:avLst/>
+          </a:prstGeom>
+          <a:ln>
+            <a:noFill/>
+          </a:ln>
+        </p:spPr>
+        <p:style>
+          <a:lnRef idx="2">
+            <a:schemeClr val="accent1">
+              <a:shade val="50000"/>
+            </a:schemeClr>
+          </a:lnRef>
+          <a:fillRef idx="1">
+            <a:schemeClr val="accent1"/>
+          </a:fillRef>
+          <a:effectRef idx="0">
+            <a:schemeClr val="accent1"/>
+          </a:effectRef>
+          <a:fontRef idx="minor">
+            <a:schemeClr val="lt1"/>
+          </a:fontRef>
+        </p:style>
+        <p:txBody>
+          <a:bodyPr rtlCol="0" anchor="ctr"/>
+          <a:lstStyle/>
+          <a:p>
+            <a:pPr algn="ctr"/>
+            <a:endParaRPr lang="en-US"/>
+          </a:p>
+        </p:txBody>
+      </p:sp>
+      <p:grpSp>
+        <p:nvGrpSpPr>
+          <p:cNvPr id="19" name="Group 18">
+            <a:extLst>
+              <a:ext uri="{FF2B5EF4-FFF2-40B4-BE49-F238E27FC236}">
+                <a16:creationId xmlns:a16="http://schemas.microsoft.com/office/drawing/2014/main" id="{79394E1F-0B5F-497D-B2A6-8383A2A54834}"/>
+              </a:ext>
+              <a:ext uri="{C183D7F6-B498-43B3-948B-1728B52AA6E4}">
+                <adec:decorative xmlns:adec="http://schemas.microsoft.com/office/drawing/2017/decorative" val="1"/>
+              </a:ext>
+            </a:extLst>
+          </p:cNvPr>
+          <p:cNvGrpSpPr>
+            <a:grpSpLocks noGrp="1" noUngrp="1" noRot="1" noChangeAspect="1" noMove="1" noResize="1"/>
+          </p:cNvGrpSpPr>
+          <p:nvPr>
+            <p:extLst>
+              <p:ext uri="{386F3935-93C4-4BCD-93E2-E3B085C9AB24}">
+                <p16:designElem xmlns:p16="http://schemas.microsoft.com/office/powerpoint/2015/main" val="1"/>
+              </p:ext>
+            </p:extLst>
+          </p:nvPr>
+        </p:nvGrpSpPr>
+        <p:grpSpPr>
+          <a:xfrm>
+            <a:off x="438068" y="457200"/>
+            <a:ext cx="3703320" cy="5935133"/>
+            <a:chOff x="438068" y="457200"/>
+            <a:chExt cx="3703320" cy="5935133"/>
+          </a:xfrm>
+        </p:grpSpPr>
+        <p:sp>
+          <p:nvSpPr>
+            <p:cNvPr id="20" name="Rectangle 19">
+              <a:extLst>
+                <a:ext uri="{FF2B5EF4-FFF2-40B4-BE49-F238E27FC236}">
+                  <a16:creationId xmlns:a16="http://schemas.microsoft.com/office/drawing/2014/main" id="{1F1FF39A-AC3C-4066-9D4C-519AA22812EA}"/>
+                </a:ext>
+                <a:ext uri="{C183D7F6-B498-43B3-948B-1728B52AA6E4}">
+                  <adec:decorative xmlns:adec="http://schemas.microsoft.com/office/drawing/2017/decorative" val="1"/>
+                </a:ext>
+              </a:extLst>
+            </p:cNvPr>
+            <p:cNvSpPr/>
+            <p:nvPr>
+              <p:extLst>
+                <p:ext uri="{386F3935-93C4-4BCD-93E2-E3B085C9AB24}">
+                  <p16:designElem xmlns:p16="http://schemas.microsoft.com/office/powerpoint/2015/main" val="1"/>
+                </p:ext>
+              </p:extLst>
+            </p:nvPr>
+          </p:nvSpPr>
+          <p:spPr>
+            <a:xfrm>
+              <a:off x="438068" y="601201"/>
+              <a:ext cx="3702134" cy="5791132"/>
+            </a:xfrm>
+            <a:prstGeom prst="rect">
+              <a:avLst/>
+            </a:prstGeom>
+            <a:solidFill>
+              <a:srgbClr val="465359">
+                <a:alpha val="97000"/>
+              </a:srgbClr>
+            </a:solidFill>
+            <a:ln w="6350" cmpd="sng">
+              <a:noFill/>
+            </a:ln>
+            <a:effectLst/>
+          </p:spPr>
+          <p:style>
+            <a:lnRef idx="1">
+              <a:schemeClr val="accent1"/>
+            </a:lnRef>
+            <a:fillRef idx="3">
+              <a:schemeClr val="accent1"/>
+            </a:fillRef>
+            <a:effectRef idx="2">
+              <a:schemeClr val="accent1"/>
+            </a:effectRef>
+            <a:fontRef idx="minor">
+              <a:schemeClr val="lt1"/>
+            </a:fontRef>
+          </p:style>
+        </p:sp>
+        <p:sp>
+          <p:nvSpPr>
+            <p:cNvPr id="21" name="Rectangle 20">
+              <a:extLst>
+                <a:ext uri="{FF2B5EF4-FFF2-40B4-BE49-F238E27FC236}">
+                  <a16:creationId xmlns:a16="http://schemas.microsoft.com/office/drawing/2014/main" id="{64C13BAB-7C00-4D21-A857-E3D41C0A2A66}"/>
+                </a:ext>
+                <a:ext uri="{C183D7F6-B498-43B3-948B-1728B52AA6E4}">
+                  <adec:decorative xmlns:adec="http://schemas.microsoft.com/office/drawing/2017/decorative" val="1"/>
+                </a:ext>
+              </a:extLst>
+            </p:cNvPr>
+            <p:cNvSpPr/>
+            <p:nvPr>
+              <p:extLst>
+                <p:ext uri="{386F3935-93C4-4BCD-93E2-E3B085C9AB24}">
+                  <p16:designElem xmlns:p16="http://schemas.microsoft.com/office/powerpoint/2015/main" val="1"/>
+                </p:ext>
+              </p:extLst>
+            </p:nvPr>
+          </p:nvSpPr>
+          <p:spPr>
+            <a:xfrm>
+              <a:off x="438068" y="457200"/>
+              <a:ext cx="3703320" cy="94997"/>
+            </a:xfrm>
+            <a:prstGeom prst="rect">
+              <a:avLst/>
+            </a:prstGeom>
+            <a:solidFill>
+              <a:srgbClr val="465359"/>
+            </a:solidFill>
+            <a:ln>
+              <a:noFill/>
+            </a:ln>
+            <a:effectLst/>
+          </p:spPr>
+          <p:style>
+            <a:lnRef idx="1">
+              <a:schemeClr val="accent1"/>
+            </a:lnRef>
+            <a:fillRef idx="3">
+              <a:schemeClr val="accent1"/>
+            </a:fillRef>
+            <a:effectRef idx="2">
+              <a:schemeClr val="accent1"/>
+            </a:effectRef>
+            <a:fontRef idx="minor">
+              <a:schemeClr val="lt1"/>
+            </a:fontRef>
+          </p:style>
+        </p:sp>
+      </p:grpSp>
+      <p:sp>
+        <p:nvSpPr>
           <p:cNvPr id="2" name="Titre 1">
             <a:extLst>
               <a:ext uri="{FF2B5EF4-FFF2-40B4-BE49-F238E27FC236}">
@@ -6968,52 +7945,880 @@
             <p:ph type="title"/>
           </p:nvPr>
         </p:nvSpPr>
-        <p:spPr/>
+        <p:spPr>
+          <a:xfrm>
+            <a:off x="584200" y="1524001"/>
+            <a:ext cx="3412067" cy="3478384"/>
+          </a:xfrm>
+        </p:spPr>
         <p:txBody>
-          <a:bodyPr/>
+          <a:bodyPr vert="horz" lIns="91440" tIns="45720" rIns="91440" bIns="45720" rtlCol="0" anchor="b">
+            <a:normAutofit/>
+          </a:bodyPr>
           <a:lstStyle/>
           <a:p>
             <a:r>
-              <a:rPr lang="fr-FR" dirty="0"/>
-              <a:t>Communication entre </a:t>
-            </a:r>
-            <a:r>
-              <a:rPr lang="fr-FR" dirty="0" err="1"/>
-              <a:t>mvc</a:t>
-            </a:r>
-            <a:endParaRPr lang="fr-FR" dirty="0"/>
+              <a:rPr lang="en-US">
+                <a:solidFill>
+                  <a:srgbClr val="FFFFFF"/>
+                </a:solidFill>
+              </a:rPr>
+              <a:t>Communication entre mvc</a:t>
+            </a:r>
           </a:p>
         </p:txBody>
       </p:sp>
-      <p:sp>
-        <p:nvSpPr>
-          <p:cNvPr id="3" name="Espace réservé du contenu 2">
+      <p:pic>
+        <p:nvPicPr>
+          <p:cNvPr id="4" name="Espace réservé du contenu 3">
             <a:extLst>
               <a:ext uri="{FF2B5EF4-FFF2-40B4-BE49-F238E27FC236}">
-                <a16:creationId xmlns:a16="http://schemas.microsoft.com/office/drawing/2014/main" id="{8BBD2C6B-BF81-DAEA-A33C-0795303DB0B0}"/>
+                <a16:creationId xmlns:a16="http://schemas.microsoft.com/office/drawing/2014/main" id="{36BC8B22-D0D1-552B-2BA1-A0C1E15BC4B4}"/>
               </a:ext>
             </a:extLst>
           </p:cNvPr>
-          <p:cNvSpPr>
-            <a:spLocks noGrp="1"/>
-          </p:cNvSpPr>
+          <p:cNvPicPr>
+            <a:picLocks noGrp="1" noChangeAspect="1"/>
+          </p:cNvPicPr>
           <p:nvPr>
             <p:ph idx="1"/>
           </p:nvPr>
-        </p:nvSpPr>
-        <p:spPr/>
-        <p:txBody>
-          <a:bodyPr/>
-          <a:lstStyle/>
-          <a:p>
-            <a:endParaRPr lang="fr-FR" dirty="0"/>
-          </a:p>
-        </p:txBody>
-      </p:sp>
+        </p:nvPicPr>
+        <p:blipFill>
+          <a:blip r:embed="rId2">
+            <a:extLst>
+              <a:ext uri="{28A0092B-C50C-407E-A947-70E740481C1C}">
+                <a14:useLocalDpi xmlns:a14="http://schemas.microsoft.com/office/drawing/2010/main" val="0"/>
+              </a:ext>
+            </a:extLst>
+          </a:blip>
+          <a:stretch>
+            <a:fillRect/>
+          </a:stretch>
+        </p:blipFill>
+        <p:spPr>
+          <a:xfrm>
+            <a:off x="4765053" y="660464"/>
+            <a:ext cx="6764864" cy="5513363"/>
+          </a:xfrm>
+          <a:prstGeom prst="rect">
+            <a:avLst/>
+          </a:prstGeom>
+        </p:spPr>
+      </p:pic>
     </p:spTree>
     <p:extLst>
       <p:ext uri="{BB962C8B-B14F-4D97-AF65-F5344CB8AC3E}">
         <p14:creationId xmlns:p14="http://schemas.microsoft.com/office/powerpoint/2010/main" val="4119547456"/>
+      </p:ext>
+    </p:extLst>
+  </p:cSld>
+  <p:clrMapOvr>
+    <a:masterClrMapping/>
+  </p:clrMapOvr>
+</p:sld>
+</file>
+
+<file path=ppt/slides/slide8.xml><?xml version="1.0" encoding="utf-8"?>
+<p:sld xmlns:a="http://schemas.openxmlformats.org/drawingml/2006/main" xmlns:r="http://schemas.openxmlformats.org/officeDocument/2006/relationships" xmlns:p="http://schemas.openxmlformats.org/presentationml/2006/main">
+  <p:cSld>
+    <p:bg>
+      <p:bgPr>
+        <a:solidFill>
+          <a:schemeClr val="bg1"/>
+        </a:solidFill>
+        <a:effectLst/>
+      </p:bgPr>
+    </p:bg>
+    <p:spTree>
+      <p:nvGrpSpPr>
+        <p:cNvPr id="1" name=""/>
+        <p:cNvGrpSpPr/>
+        <p:nvPr/>
+      </p:nvGrpSpPr>
+      <p:grpSpPr>
+        <a:xfrm>
+          <a:off x="0" y="0"/>
+          <a:ext cx="0" cy="0"/>
+          <a:chOff x="0" y="0"/>
+          <a:chExt cx="0" cy="0"/>
+        </a:xfrm>
+      </p:grpSpPr>
+      <p:sp>
+        <p:nvSpPr>
+          <p:cNvPr id="10" name="Rectangle 9">
+            <a:extLst>
+              <a:ext uri="{FF2B5EF4-FFF2-40B4-BE49-F238E27FC236}">
+                <a16:creationId xmlns:a16="http://schemas.microsoft.com/office/drawing/2014/main" id="{DD651B61-325E-4E73-8445-38B0DE8AAAB6}"/>
+              </a:ext>
+              <a:ext uri="{C183D7F6-B498-43B3-948B-1728B52AA6E4}">
+                <adec:decorative xmlns:adec="http://schemas.microsoft.com/office/drawing/2017/decorative" val="1"/>
+              </a:ext>
+            </a:extLst>
+          </p:cNvPr>
+          <p:cNvSpPr>
+            <a:spLocks noGrp="1" noRot="1" noChangeAspect="1" noMove="1" noResize="1" noEditPoints="1" noAdjustHandles="1" noChangeArrowheads="1" noChangeShapeType="1" noTextEdit="1"/>
+          </p:cNvSpPr>
+          <p:nvPr>
+            <p:extLst>
+              <p:ext uri="{386F3935-93C4-4BCD-93E2-E3B085C9AB24}">
+                <p16:designElem xmlns:p16="http://schemas.microsoft.com/office/powerpoint/2015/main" val="1"/>
+              </p:ext>
+            </p:extLst>
+          </p:nvPr>
+        </p:nvSpPr>
+        <p:spPr>
+          <a:xfrm>
+            <a:off x="446534" y="457200"/>
+            <a:ext cx="3703320" cy="94997"/>
+          </a:xfrm>
+          <a:prstGeom prst="rect">
+            <a:avLst/>
+          </a:prstGeom>
+          <a:solidFill>
+            <a:srgbClr val="465359"/>
+          </a:solidFill>
+          <a:ln>
+            <a:noFill/>
+          </a:ln>
+          <a:effectLst/>
+        </p:spPr>
+        <p:style>
+          <a:lnRef idx="1">
+            <a:schemeClr val="accent1"/>
+          </a:lnRef>
+          <a:fillRef idx="3">
+            <a:schemeClr val="accent1"/>
+          </a:fillRef>
+          <a:effectRef idx="2">
+            <a:schemeClr val="accent1"/>
+          </a:effectRef>
+          <a:fontRef idx="minor">
+            <a:schemeClr val="lt1"/>
+          </a:fontRef>
+        </p:style>
+      </p:sp>
+      <p:sp>
+        <p:nvSpPr>
+          <p:cNvPr id="12" name="Rectangle 11">
+            <a:extLst>
+              <a:ext uri="{FF2B5EF4-FFF2-40B4-BE49-F238E27FC236}">
+                <a16:creationId xmlns:a16="http://schemas.microsoft.com/office/drawing/2014/main" id="{B42E5253-D3AC-4AC2-B766-8B34F13C2F5E}"/>
+              </a:ext>
+              <a:ext uri="{C183D7F6-B498-43B3-948B-1728B52AA6E4}">
+                <adec:decorative xmlns:adec="http://schemas.microsoft.com/office/drawing/2017/decorative" val="1"/>
+              </a:ext>
+            </a:extLst>
+          </p:cNvPr>
+          <p:cNvSpPr>
+            <a:spLocks noGrp="1" noRot="1" noChangeAspect="1" noMove="1" noResize="1" noEditPoints="1" noAdjustHandles="1" noChangeArrowheads="1" noChangeShapeType="1" noTextEdit="1"/>
+          </p:cNvSpPr>
+          <p:nvPr>
+            <p:extLst>
+              <p:ext uri="{386F3935-93C4-4BCD-93E2-E3B085C9AB24}">
+                <p16:designElem xmlns:p16="http://schemas.microsoft.com/office/powerpoint/2015/main" val="1"/>
+              </p:ext>
+            </p:extLst>
+          </p:nvPr>
+        </p:nvSpPr>
+        <p:spPr>
+          <a:xfrm>
+            <a:off x="8042147" y="453643"/>
+            <a:ext cx="3703320" cy="98554"/>
+          </a:xfrm>
+          <a:prstGeom prst="rect">
+            <a:avLst/>
+          </a:prstGeom>
+          <a:solidFill>
+            <a:srgbClr val="969FA7"/>
+          </a:solidFill>
+          <a:ln>
+            <a:noFill/>
+          </a:ln>
+          <a:effectLst/>
+        </p:spPr>
+        <p:style>
+          <a:lnRef idx="1">
+            <a:schemeClr val="accent1"/>
+          </a:lnRef>
+          <a:fillRef idx="3">
+            <a:schemeClr val="accent1"/>
+          </a:fillRef>
+          <a:effectRef idx="2">
+            <a:schemeClr val="accent1"/>
+          </a:effectRef>
+          <a:fontRef idx="minor">
+            <a:schemeClr val="lt1"/>
+          </a:fontRef>
+        </p:style>
+      </p:sp>
+      <p:sp>
+        <p:nvSpPr>
+          <p:cNvPr id="14" name="Rectangle 13">
+            <a:extLst>
+              <a:ext uri="{FF2B5EF4-FFF2-40B4-BE49-F238E27FC236}">
+                <a16:creationId xmlns:a16="http://schemas.microsoft.com/office/drawing/2014/main" id="{10AE8D57-436A-4073-9A75-15BB5949F8B4}"/>
+              </a:ext>
+              <a:ext uri="{C183D7F6-B498-43B3-948B-1728B52AA6E4}">
+                <adec:decorative xmlns:adec="http://schemas.microsoft.com/office/drawing/2017/decorative" val="1"/>
+              </a:ext>
+            </a:extLst>
+          </p:cNvPr>
+          <p:cNvSpPr>
+            <a:spLocks noGrp="1" noRot="1" noChangeAspect="1" noMove="1" noResize="1" noEditPoints="1" noAdjustHandles="1" noChangeArrowheads="1" noChangeShapeType="1" noTextEdit="1"/>
+          </p:cNvSpPr>
+          <p:nvPr>
+            <p:extLst>
+              <p:ext uri="{386F3935-93C4-4BCD-93E2-E3B085C9AB24}">
+                <p16:designElem xmlns:p16="http://schemas.microsoft.com/office/powerpoint/2015/main" val="1"/>
+              </p:ext>
+            </p:extLst>
+          </p:nvPr>
+        </p:nvSpPr>
+        <p:spPr>
+          <a:xfrm>
+            <a:off x="4241830" y="457200"/>
+            <a:ext cx="3703320" cy="91440"/>
+          </a:xfrm>
+          <a:prstGeom prst="rect">
+            <a:avLst/>
+          </a:prstGeom>
+          <a:solidFill>
+            <a:schemeClr val="accent1"/>
+          </a:solidFill>
+          <a:ln>
+            <a:noFill/>
+          </a:ln>
+          <a:effectLst/>
+        </p:spPr>
+        <p:style>
+          <a:lnRef idx="1">
+            <a:schemeClr val="accent1"/>
+          </a:lnRef>
+          <a:fillRef idx="3">
+            <a:schemeClr val="accent1"/>
+          </a:fillRef>
+          <a:effectRef idx="2">
+            <a:schemeClr val="accent1"/>
+          </a:effectRef>
+          <a:fontRef idx="minor">
+            <a:schemeClr val="lt1"/>
+          </a:fontRef>
+        </p:style>
+      </p:sp>
+      <p:sp>
+        <p:nvSpPr>
+          <p:cNvPr id="16" name="Rectangle 15">
+            <a:extLst>
+              <a:ext uri="{FF2B5EF4-FFF2-40B4-BE49-F238E27FC236}">
+                <a16:creationId xmlns:a16="http://schemas.microsoft.com/office/drawing/2014/main" id="{E2852671-8EB6-4EAF-8AF8-65CF3FD66456}"/>
+              </a:ext>
+              <a:ext uri="{C183D7F6-B498-43B3-948B-1728B52AA6E4}">
+                <adec:decorative xmlns:adec="http://schemas.microsoft.com/office/drawing/2017/decorative" val="1"/>
+              </a:ext>
+            </a:extLst>
+          </p:cNvPr>
+          <p:cNvSpPr>
+            <a:spLocks noGrp="1" noRot="1" noChangeAspect="1" noMove="1" noResize="1" noEditPoints="1" noAdjustHandles="1" noChangeArrowheads="1" noChangeShapeType="1" noTextEdit="1"/>
+          </p:cNvSpPr>
+          <p:nvPr>
+            <p:extLst>
+              <p:ext uri="{386F3935-93C4-4BCD-93E2-E3B085C9AB24}">
+                <p16:designElem xmlns:p16="http://schemas.microsoft.com/office/powerpoint/2015/main" val="1"/>
+              </p:ext>
+            </p:extLst>
+          </p:nvPr>
+        </p:nvSpPr>
+        <p:spPr>
+          <a:xfrm>
+            <a:off x="446534" y="3085764"/>
+            <a:ext cx="11298932" cy="3338149"/>
+          </a:xfrm>
+          <a:prstGeom prst="rect">
+            <a:avLst/>
+          </a:prstGeom>
+          <a:solidFill>
+            <a:srgbClr val="465359"/>
+          </a:solidFill>
+          <a:ln>
+            <a:noFill/>
+          </a:ln>
+          <a:effectLst/>
+        </p:spPr>
+        <p:style>
+          <a:lnRef idx="1">
+            <a:schemeClr val="accent1"/>
+          </a:lnRef>
+          <a:fillRef idx="3">
+            <a:schemeClr val="accent1"/>
+          </a:fillRef>
+          <a:effectRef idx="2">
+            <a:schemeClr val="accent1"/>
+          </a:effectRef>
+          <a:fontRef idx="minor">
+            <a:schemeClr val="lt1"/>
+          </a:fontRef>
+        </p:style>
+      </p:sp>
+      <p:sp useBgFill="1">
+        <p:nvSpPr>
+          <p:cNvPr id="18" name="Rectangle 17">
+            <a:extLst>
+              <a:ext uri="{FF2B5EF4-FFF2-40B4-BE49-F238E27FC236}">
+                <a16:creationId xmlns:a16="http://schemas.microsoft.com/office/drawing/2014/main" id="{26B4480E-B7FF-4481-890E-043A69AE6FE2}"/>
+              </a:ext>
+              <a:ext uri="{C183D7F6-B498-43B3-948B-1728B52AA6E4}">
+                <adec:decorative xmlns:adec="http://schemas.microsoft.com/office/drawing/2017/decorative" val="1"/>
+              </a:ext>
+            </a:extLst>
+          </p:cNvPr>
+          <p:cNvSpPr>
+            <a:spLocks noGrp="1" noRot="1" noChangeAspect="1" noMove="1" noResize="1" noEditPoints="1" noAdjustHandles="1" noChangeArrowheads="1" noChangeShapeType="1" noTextEdit="1"/>
+          </p:cNvSpPr>
+          <p:nvPr>
+            <p:extLst>
+              <p:ext uri="{386F3935-93C4-4BCD-93E2-E3B085C9AB24}">
+                <p16:designElem xmlns:p16="http://schemas.microsoft.com/office/powerpoint/2015/main" val="1"/>
+              </p:ext>
+            </p:extLst>
+          </p:nvPr>
+        </p:nvSpPr>
+        <p:spPr>
+          <a:xfrm>
+            <a:off x="0" y="0"/>
+            <a:ext cx="12192000" cy="6858000"/>
+          </a:xfrm>
+          <a:prstGeom prst="rect">
+            <a:avLst/>
+          </a:prstGeom>
+          <a:ln>
+            <a:noFill/>
+          </a:ln>
+        </p:spPr>
+        <p:style>
+          <a:lnRef idx="2">
+            <a:schemeClr val="accent1">
+              <a:shade val="50000"/>
+            </a:schemeClr>
+          </a:lnRef>
+          <a:fillRef idx="1">
+            <a:schemeClr val="accent1"/>
+          </a:fillRef>
+          <a:effectRef idx="0">
+            <a:schemeClr val="accent1"/>
+          </a:effectRef>
+          <a:fontRef idx="minor">
+            <a:schemeClr val="lt1"/>
+          </a:fontRef>
+        </p:style>
+        <p:txBody>
+          <a:bodyPr rtlCol="0" anchor="ctr"/>
+          <a:lstStyle/>
+          <a:p>
+            <a:pPr algn="ctr"/>
+            <a:endParaRPr lang="en-US"/>
+          </a:p>
+        </p:txBody>
+      </p:sp>
+      <p:grpSp>
+        <p:nvGrpSpPr>
+          <p:cNvPr id="20" name="Group 19">
+            <a:extLst>
+              <a:ext uri="{FF2B5EF4-FFF2-40B4-BE49-F238E27FC236}">
+                <a16:creationId xmlns:a16="http://schemas.microsoft.com/office/drawing/2014/main" id="{79394E1F-0B5F-497D-B2A6-8383A2A54834}"/>
+              </a:ext>
+              <a:ext uri="{C183D7F6-B498-43B3-948B-1728B52AA6E4}">
+                <adec:decorative xmlns:adec="http://schemas.microsoft.com/office/drawing/2017/decorative" val="1"/>
+              </a:ext>
+            </a:extLst>
+          </p:cNvPr>
+          <p:cNvGrpSpPr>
+            <a:grpSpLocks noGrp="1" noUngrp="1" noRot="1" noChangeAspect="1" noMove="1" noResize="1"/>
+          </p:cNvGrpSpPr>
+          <p:nvPr>
+            <p:extLst>
+              <p:ext uri="{386F3935-93C4-4BCD-93E2-E3B085C9AB24}">
+                <p16:designElem xmlns:p16="http://schemas.microsoft.com/office/powerpoint/2015/main" val="1"/>
+              </p:ext>
+            </p:extLst>
+          </p:nvPr>
+        </p:nvGrpSpPr>
+        <p:grpSpPr>
+          <a:xfrm>
+            <a:off x="438068" y="457200"/>
+            <a:ext cx="3703320" cy="5935133"/>
+            <a:chOff x="438068" y="457200"/>
+            <a:chExt cx="3703320" cy="5935133"/>
+          </a:xfrm>
+        </p:grpSpPr>
+        <p:sp>
+          <p:nvSpPr>
+            <p:cNvPr id="21" name="Rectangle 20">
+              <a:extLst>
+                <a:ext uri="{FF2B5EF4-FFF2-40B4-BE49-F238E27FC236}">
+                  <a16:creationId xmlns:a16="http://schemas.microsoft.com/office/drawing/2014/main" id="{1F1FF39A-AC3C-4066-9D4C-519AA22812EA}"/>
+                </a:ext>
+                <a:ext uri="{C183D7F6-B498-43B3-948B-1728B52AA6E4}">
+                  <adec:decorative xmlns:adec="http://schemas.microsoft.com/office/drawing/2017/decorative" val="1"/>
+                </a:ext>
+              </a:extLst>
+            </p:cNvPr>
+            <p:cNvSpPr/>
+            <p:nvPr>
+              <p:extLst>
+                <p:ext uri="{386F3935-93C4-4BCD-93E2-E3B085C9AB24}">
+                  <p16:designElem xmlns:p16="http://schemas.microsoft.com/office/powerpoint/2015/main" val="1"/>
+                </p:ext>
+              </p:extLst>
+            </p:nvPr>
+          </p:nvSpPr>
+          <p:spPr>
+            <a:xfrm>
+              <a:off x="438068" y="601201"/>
+              <a:ext cx="3702134" cy="5791132"/>
+            </a:xfrm>
+            <a:prstGeom prst="rect">
+              <a:avLst/>
+            </a:prstGeom>
+            <a:solidFill>
+              <a:srgbClr val="465359">
+                <a:alpha val="97000"/>
+              </a:srgbClr>
+            </a:solidFill>
+            <a:ln w="6350" cmpd="sng">
+              <a:noFill/>
+            </a:ln>
+            <a:effectLst/>
+          </p:spPr>
+          <p:style>
+            <a:lnRef idx="1">
+              <a:schemeClr val="accent1"/>
+            </a:lnRef>
+            <a:fillRef idx="3">
+              <a:schemeClr val="accent1"/>
+            </a:fillRef>
+            <a:effectRef idx="2">
+              <a:schemeClr val="accent1"/>
+            </a:effectRef>
+            <a:fontRef idx="minor">
+              <a:schemeClr val="lt1"/>
+            </a:fontRef>
+          </p:style>
+        </p:sp>
+        <p:sp>
+          <p:nvSpPr>
+            <p:cNvPr id="22" name="Rectangle 21">
+              <a:extLst>
+                <a:ext uri="{FF2B5EF4-FFF2-40B4-BE49-F238E27FC236}">
+                  <a16:creationId xmlns:a16="http://schemas.microsoft.com/office/drawing/2014/main" id="{64C13BAB-7C00-4D21-A857-E3D41C0A2A66}"/>
+                </a:ext>
+                <a:ext uri="{C183D7F6-B498-43B3-948B-1728B52AA6E4}">
+                  <adec:decorative xmlns:adec="http://schemas.microsoft.com/office/drawing/2017/decorative" val="1"/>
+                </a:ext>
+              </a:extLst>
+            </p:cNvPr>
+            <p:cNvSpPr/>
+            <p:nvPr>
+              <p:extLst>
+                <p:ext uri="{386F3935-93C4-4BCD-93E2-E3B085C9AB24}">
+                  <p16:designElem xmlns:p16="http://schemas.microsoft.com/office/powerpoint/2015/main" val="1"/>
+                </p:ext>
+              </p:extLst>
+            </p:nvPr>
+          </p:nvSpPr>
+          <p:spPr>
+            <a:xfrm>
+              <a:off x="438068" y="457200"/>
+              <a:ext cx="3703320" cy="94997"/>
+            </a:xfrm>
+            <a:prstGeom prst="rect">
+              <a:avLst/>
+            </a:prstGeom>
+            <a:solidFill>
+              <a:srgbClr val="465359"/>
+            </a:solidFill>
+            <a:ln>
+              <a:noFill/>
+            </a:ln>
+            <a:effectLst/>
+          </p:spPr>
+          <p:style>
+            <a:lnRef idx="1">
+              <a:schemeClr val="accent1"/>
+            </a:lnRef>
+            <a:fillRef idx="3">
+              <a:schemeClr val="accent1"/>
+            </a:fillRef>
+            <a:effectRef idx="2">
+              <a:schemeClr val="accent1"/>
+            </a:effectRef>
+            <a:fontRef idx="minor">
+              <a:schemeClr val="lt1"/>
+            </a:fontRef>
+          </p:style>
+        </p:sp>
+      </p:grpSp>
+      <p:sp>
+        <p:nvSpPr>
+          <p:cNvPr id="2" name="Titre 1">
+            <a:extLst>
+              <a:ext uri="{FF2B5EF4-FFF2-40B4-BE49-F238E27FC236}">
+                <a16:creationId xmlns:a16="http://schemas.microsoft.com/office/drawing/2014/main" id="{4B3BEAB0-CD94-5B01-DA9F-080E5EF51460}"/>
+              </a:ext>
+            </a:extLst>
+          </p:cNvPr>
+          <p:cNvSpPr>
+            <a:spLocks noGrp="1"/>
+          </p:cNvSpPr>
+          <p:nvPr>
+            <p:ph type="title"/>
+          </p:nvPr>
+        </p:nvSpPr>
+        <p:spPr>
+          <a:xfrm>
+            <a:off x="584200" y="1524001"/>
+            <a:ext cx="3412067" cy="3478384"/>
+          </a:xfrm>
+        </p:spPr>
+        <p:txBody>
+          <a:bodyPr vert="horz" lIns="91440" tIns="45720" rIns="91440" bIns="45720" rtlCol="0" anchor="b">
+            <a:normAutofit/>
+          </a:bodyPr>
+          <a:lstStyle/>
+          <a:p>
+            <a:r>
+              <a:rPr lang="en-US">
+                <a:solidFill>
+                  <a:srgbClr val="FFFFFF"/>
+                </a:solidFill>
+              </a:rPr>
+              <a:t>Démonstration de l’application</a:t>
+            </a:r>
+          </a:p>
+        </p:txBody>
+      </p:sp>
+      <p:pic>
+        <p:nvPicPr>
+          <p:cNvPr id="7" name="Graphic 6" descr="Enseignant">
+            <a:extLst>
+              <a:ext uri="{FF2B5EF4-FFF2-40B4-BE49-F238E27FC236}">
+                <a16:creationId xmlns:a16="http://schemas.microsoft.com/office/drawing/2014/main" id="{778700BB-3F2B-1467-9A53-CA789CBD6E96}"/>
+              </a:ext>
+            </a:extLst>
+          </p:cNvPr>
+          <p:cNvPicPr>
+            <a:picLocks noChangeAspect="1"/>
+          </p:cNvPicPr>
+          <p:nvPr/>
+        </p:nvPicPr>
+        <p:blipFill>
+          <a:blip r:embed="rId2">
+            <a:extLst>
+              <a:ext uri="{28A0092B-C50C-407E-A947-70E740481C1C}">
+                <a14:useLocalDpi xmlns:a14="http://schemas.microsoft.com/office/drawing/2010/main" val="0"/>
+              </a:ext>
+              <a:ext uri="{96DAC541-7B7A-43D3-8B79-37D633B846F1}">
+                <asvg:svgBlip xmlns:asvg="http://schemas.microsoft.com/office/drawing/2016/SVG/main" r:embed="rId3"/>
+              </a:ext>
+            </a:extLst>
+          </a:blip>
+          <a:stretch>
+            <a:fillRect/>
+          </a:stretch>
+        </p:blipFill>
+        <p:spPr>
+          <a:xfrm>
+            <a:off x="5348406" y="618067"/>
+            <a:ext cx="5598157" cy="5598157"/>
+          </a:xfrm>
+          <a:prstGeom prst="rect">
+            <a:avLst/>
+          </a:prstGeom>
+        </p:spPr>
+      </p:pic>
+    </p:spTree>
+    <p:extLst>
+      <p:ext uri="{BB962C8B-B14F-4D97-AF65-F5344CB8AC3E}">
+        <p14:creationId xmlns:p14="http://schemas.microsoft.com/office/powerpoint/2010/main" val="1767854227"/>
+      </p:ext>
+    </p:extLst>
+  </p:cSld>
+  <p:clrMapOvr>
+    <a:masterClrMapping/>
+  </p:clrMapOvr>
+</p:sld>
+</file>
+
+<file path=ppt/slides/slide9.xml><?xml version="1.0" encoding="utf-8"?>
+<p:sld xmlns:a="http://schemas.openxmlformats.org/drawingml/2006/main" xmlns:r="http://schemas.openxmlformats.org/officeDocument/2006/relationships" xmlns:p="http://schemas.openxmlformats.org/presentationml/2006/main">
+  <p:cSld>
+    <p:bg>
+      <p:bgPr>
+        <a:solidFill>
+          <a:schemeClr val="bg1"/>
+        </a:solidFill>
+        <a:effectLst/>
+      </p:bgPr>
+    </p:bg>
+    <p:spTree>
+      <p:nvGrpSpPr>
+        <p:cNvPr id="1" name=""/>
+        <p:cNvGrpSpPr/>
+        <p:nvPr/>
+      </p:nvGrpSpPr>
+      <p:grpSpPr>
+        <a:xfrm>
+          <a:off x="0" y="0"/>
+          <a:ext cx="0" cy="0"/>
+          <a:chOff x="0" y="0"/>
+          <a:chExt cx="0" cy="0"/>
+        </a:xfrm>
+      </p:grpSpPr>
+      <p:sp useBgFill="1">
+        <p:nvSpPr>
+          <p:cNvPr id="9" name="Rectangle 8">
+            <a:extLst>
+              <a:ext uri="{FF2B5EF4-FFF2-40B4-BE49-F238E27FC236}">
+                <a16:creationId xmlns:a16="http://schemas.microsoft.com/office/drawing/2014/main" id="{504BED40-EAF7-4E55-AFF7-2CD840EBD3AA}"/>
+              </a:ext>
+              <a:ext uri="{C183D7F6-B498-43B3-948B-1728B52AA6E4}">
+                <adec:decorative xmlns:adec="http://schemas.microsoft.com/office/drawing/2017/decorative" val="1"/>
+              </a:ext>
+            </a:extLst>
+          </p:cNvPr>
+          <p:cNvSpPr>
+            <a:spLocks noGrp="1" noRot="1" noChangeAspect="1" noMove="1" noResize="1" noEditPoints="1" noAdjustHandles="1" noChangeArrowheads="1" noChangeShapeType="1" noTextEdit="1"/>
+          </p:cNvSpPr>
+          <p:nvPr>
+            <p:extLst>
+              <p:ext uri="{386F3935-93C4-4BCD-93E2-E3B085C9AB24}">
+                <p16:designElem xmlns:p16="http://schemas.microsoft.com/office/powerpoint/2015/main" val="1"/>
+              </p:ext>
+            </p:extLst>
+          </p:nvPr>
+        </p:nvSpPr>
+        <p:spPr>
+          <a:xfrm>
+            <a:off x="0" y="0"/>
+            <a:ext cx="12192000" cy="6858000"/>
+          </a:xfrm>
+          <a:prstGeom prst="rect">
+            <a:avLst/>
+          </a:prstGeom>
+          <a:ln>
+            <a:noFill/>
+          </a:ln>
+        </p:spPr>
+        <p:style>
+          <a:lnRef idx="2">
+            <a:schemeClr val="accent1">
+              <a:shade val="50000"/>
+            </a:schemeClr>
+          </a:lnRef>
+          <a:fillRef idx="1">
+            <a:schemeClr val="accent1"/>
+          </a:fillRef>
+          <a:effectRef idx="0">
+            <a:schemeClr val="accent1"/>
+          </a:effectRef>
+          <a:fontRef idx="minor">
+            <a:schemeClr val="lt1"/>
+          </a:fontRef>
+        </p:style>
+        <p:txBody>
+          <a:bodyPr rtlCol="0" anchor="ctr"/>
+          <a:lstStyle/>
+          <a:p>
+            <a:pPr algn="ctr"/>
+            <a:endParaRPr lang="en-US"/>
+          </a:p>
+        </p:txBody>
+      </p:sp>
+      <p:sp>
+        <p:nvSpPr>
+          <p:cNvPr id="2" name="Titre 1">
+            <a:extLst>
+              <a:ext uri="{FF2B5EF4-FFF2-40B4-BE49-F238E27FC236}">
+                <a16:creationId xmlns:a16="http://schemas.microsoft.com/office/drawing/2014/main" id="{264FC2B0-8AE4-FC80-1E98-4136DF45C747}"/>
+              </a:ext>
+            </a:extLst>
+          </p:cNvPr>
+          <p:cNvSpPr>
+            <a:spLocks noGrp="1"/>
+          </p:cNvSpPr>
+          <p:nvPr>
+            <p:ph type="title"/>
+          </p:nvPr>
+        </p:nvSpPr>
+        <p:spPr>
+          <a:xfrm>
+            <a:off x="581193" y="702156"/>
+            <a:ext cx="6309003" cy="1013800"/>
+          </a:xfrm>
+        </p:spPr>
+        <p:txBody>
+          <a:bodyPr>
+            <a:normAutofit/>
+          </a:bodyPr>
+          <a:lstStyle/>
+          <a:p>
+            <a:r>
+              <a:rPr lang="fr-FR">
+                <a:solidFill>
+                  <a:schemeClr val="tx2"/>
+                </a:solidFill>
+              </a:rPr>
+              <a:t>Conclusion</a:t>
+            </a:r>
+          </a:p>
+        </p:txBody>
+      </p:sp>
+      <p:sp>
+        <p:nvSpPr>
+          <p:cNvPr id="11" name="Rectangle 10">
+            <a:extLst>
+              <a:ext uri="{FF2B5EF4-FFF2-40B4-BE49-F238E27FC236}">
+                <a16:creationId xmlns:a16="http://schemas.microsoft.com/office/drawing/2014/main" id="{F367CCF1-BB1E-41CF-8499-94A870C33EFA}"/>
+              </a:ext>
+              <a:ext uri="{C183D7F6-B498-43B3-948B-1728B52AA6E4}">
+                <adec:decorative xmlns:adec="http://schemas.microsoft.com/office/drawing/2017/decorative" val="1"/>
+              </a:ext>
+            </a:extLst>
+          </p:cNvPr>
+          <p:cNvSpPr>
+            <a:spLocks noGrp="1" noRot="1" noChangeAspect="1" noMove="1" noResize="1" noEditPoints="1" noAdjustHandles="1" noChangeArrowheads="1" noChangeShapeType="1" noTextEdit="1"/>
+          </p:cNvSpPr>
+          <p:nvPr>
+            <p:extLst>
+              <p:ext uri="{386F3935-93C4-4BCD-93E2-E3B085C9AB24}">
+                <p16:designElem xmlns:p16="http://schemas.microsoft.com/office/powerpoint/2015/main" val="1"/>
+              </p:ext>
+            </p:extLst>
+          </p:nvPr>
+        </p:nvSpPr>
+        <p:spPr>
+          <a:xfrm>
+            <a:off x="446534" y="457200"/>
+            <a:ext cx="6675120" cy="94997"/>
+          </a:xfrm>
+          <a:prstGeom prst="rect">
+            <a:avLst/>
+          </a:prstGeom>
+          <a:solidFill>
+            <a:schemeClr val="accent1"/>
+          </a:solidFill>
+          <a:ln>
+            <a:noFill/>
+          </a:ln>
+          <a:effectLst/>
+        </p:spPr>
+        <p:style>
+          <a:lnRef idx="1">
+            <a:schemeClr val="accent1"/>
+          </a:lnRef>
+          <a:fillRef idx="3">
+            <a:schemeClr val="accent1"/>
+          </a:fillRef>
+          <a:effectRef idx="2">
+            <a:schemeClr val="accent1"/>
+          </a:effectRef>
+          <a:fontRef idx="minor">
+            <a:schemeClr val="lt1"/>
+          </a:fontRef>
+        </p:style>
+      </p:sp>
+      <p:sp>
+        <p:nvSpPr>
+          <p:cNvPr id="3" name="Espace réservé du contenu 2">
+            <a:extLst>
+              <a:ext uri="{FF2B5EF4-FFF2-40B4-BE49-F238E27FC236}">
+                <a16:creationId xmlns:a16="http://schemas.microsoft.com/office/drawing/2014/main" id="{DA8C2DE9-60D1-087B-AD95-030105367C89}"/>
+              </a:ext>
+            </a:extLst>
+          </p:cNvPr>
+          <p:cNvSpPr>
+            <a:spLocks noGrp="1"/>
+          </p:cNvSpPr>
+          <p:nvPr>
+            <p:ph idx="1"/>
+          </p:nvPr>
+        </p:nvSpPr>
+        <p:spPr>
+          <a:xfrm>
+            <a:off x="581194" y="1896533"/>
+            <a:ext cx="6309003" cy="3962266"/>
+          </a:xfrm>
+        </p:spPr>
+        <p:txBody>
+          <a:bodyPr>
+            <a:normAutofit/>
+          </a:bodyPr>
+          <a:lstStyle/>
+          <a:p>
+            <a:r>
+              <a:rPr lang="fr-FR" dirty="0">
+                <a:solidFill>
+                  <a:schemeClr val="tx2"/>
+                </a:solidFill>
+              </a:rPr>
+              <a:t>Feedbacks</a:t>
+            </a:r>
+          </a:p>
+          <a:p>
+            <a:r>
+              <a:rPr lang="fr-FR" dirty="0">
+                <a:solidFill>
+                  <a:schemeClr val="tx2"/>
+                </a:solidFill>
+              </a:rPr>
+              <a:t>Difficultés rencontrées</a:t>
+            </a:r>
+          </a:p>
+          <a:p>
+            <a:r>
+              <a:rPr lang="fr-FR" dirty="0">
+                <a:solidFill>
+                  <a:schemeClr val="tx2"/>
+                </a:solidFill>
+              </a:rPr>
+              <a:t>Et après ?</a:t>
+            </a:r>
+          </a:p>
+        </p:txBody>
+      </p:sp>
+      <p:pic>
+        <p:nvPicPr>
+          <p:cNvPr id="5" name="Picture 4" descr="Plusieurs points d’interrogation sur fond noir">
+            <a:extLst>
+              <a:ext uri="{FF2B5EF4-FFF2-40B4-BE49-F238E27FC236}">
+                <a16:creationId xmlns:a16="http://schemas.microsoft.com/office/drawing/2014/main" id="{63C7FDF4-6E6D-5F57-F32C-71A99A13F358}"/>
+              </a:ext>
+            </a:extLst>
+          </p:cNvPr>
+          <p:cNvPicPr>
+            <a:picLocks noChangeAspect="1"/>
+          </p:cNvPicPr>
+          <p:nvPr/>
+        </p:nvPicPr>
+        <p:blipFill rotWithShape="1">
+          <a:blip r:embed="rId2"/>
+          <a:srcRect l="58454" r="2" b="2"/>
+          <a:stretch/>
+        </p:blipFill>
+        <p:spPr>
+          <a:xfrm>
+            <a:off x="7521283" y="10"/>
+            <a:ext cx="4670717" cy="6857990"/>
+          </a:xfrm>
+          <a:prstGeom prst="rect">
+            <a:avLst/>
+          </a:prstGeom>
+        </p:spPr>
+      </p:pic>
+    </p:spTree>
+    <p:extLst>
+      <p:ext uri="{BB962C8B-B14F-4D97-AF65-F5344CB8AC3E}">
+        <p14:creationId xmlns:p14="http://schemas.microsoft.com/office/powerpoint/2010/main" val="944454262"/>
       </p:ext>
     </p:extLst>
   </p:cSld>

</xml_diff>